<commit_message>
Merged docs from Andoni.
</commit_message>
<xml_diff>
--- a/doc/tex/algorithms/filter/figures/Test_Filter_Dia.pptx
+++ b/doc/tex/algorithms/filter/figures/Test_Filter_Dia.pptx
@@ -243,7 +243,7 @@
           <a:p>
             <a:fld id="{2680F75E-BF8A-4352-8DF2-5712531B63DB}" type="datetimeFigureOut">
               <a:rPr lang="pt-PT" smtClean="0"/>
-              <a:t>26/02/2018</a:t>
+              <a:t>23/03/2018</a:t>
             </a:fld>
             <a:endParaRPr lang="pt-PT"/>
           </a:p>
@@ -413,7 +413,7 @@
           <a:p>
             <a:fld id="{2680F75E-BF8A-4352-8DF2-5712531B63DB}" type="datetimeFigureOut">
               <a:rPr lang="pt-PT" smtClean="0"/>
-              <a:t>26/02/2018</a:t>
+              <a:t>23/03/2018</a:t>
             </a:fld>
             <a:endParaRPr lang="pt-PT"/>
           </a:p>
@@ -593,7 +593,7 @@
           <a:p>
             <a:fld id="{2680F75E-BF8A-4352-8DF2-5712531B63DB}" type="datetimeFigureOut">
               <a:rPr lang="pt-PT" smtClean="0"/>
-              <a:t>26/02/2018</a:t>
+              <a:t>23/03/2018</a:t>
             </a:fld>
             <a:endParaRPr lang="pt-PT"/>
           </a:p>
@@ -763,7 +763,7 @@
           <a:p>
             <a:fld id="{2680F75E-BF8A-4352-8DF2-5712531B63DB}" type="datetimeFigureOut">
               <a:rPr lang="pt-PT" smtClean="0"/>
-              <a:t>26/02/2018</a:t>
+              <a:t>23/03/2018</a:t>
             </a:fld>
             <a:endParaRPr lang="pt-PT"/>
           </a:p>
@@ -1009,7 +1009,7 @@
           <a:p>
             <a:fld id="{2680F75E-BF8A-4352-8DF2-5712531B63DB}" type="datetimeFigureOut">
               <a:rPr lang="pt-PT" smtClean="0"/>
-              <a:t>26/02/2018</a:t>
+              <a:t>23/03/2018</a:t>
             </a:fld>
             <a:endParaRPr lang="pt-PT"/>
           </a:p>
@@ -1241,7 +1241,7 @@
           <a:p>
             <a:fld id="{2680F75E-BF8A-4352-8DF2-5712531B63DB}" type="datetimeFigureOut">
               <a:rPr lang="pt-PT" smtClean="0"/>
-              <a:t>26/02/2018</a:t>
+              <a:t>23/03/2018</a:t>
             </a:fld>
             <a:endParaRPr lang="pt-PT"/>
           </a:p>
@@ -1608,7 +1608,7 @@
           <a:p>
             <a:fld id="{2680F75E-BF8A-4352-8DF2-5712531B63DB}" type="datetimeFigureOut">
               <a:rPr lang="pt-PT" smtClean="0"/>
-              <a:t>26/02/2018</a:t>
+              <a:t>23/03/2018</a:t>
             </a:fld>
             <a:endParaRPr lang="pt-PT"/>
           </a:p>
@@ -1726,7 +1726,7 @@
           <a:p>
             <a:fld id="{2680F75E-BF8A-4352-8DF2-5712531B63DB}" type="datetimeFigureOut">
               <a:rPr lang="pt-PT" smtClean="0"/>
-              <a:t>26/02/2018</a:t>
+              <a:t>23/03/2018</a:t>
             </a:fld>
             <a:endParaRPr lang="pt-PT"/>
           </a:p>
@@ -1821,7 +1821,7 @@
           <a:p>
             <a:fld id="{2680F75E-BF8A-4352-8DF2-5712531B63DB}" type="datetimeFigureOut">
               <a:rPr lang="pt-PT" smtClean="0"/>
-              <a:t>26/02/2018</a:t>
+              <a:t>23/03/2018</a:t>
             </a:fld>
             <a:endParaRPr lang="pt-PT"/>
           </a:p>
@@ -2098,7 +2098,7 @@
           <a:p>
             <a:fld id="{2680F75E-BF8A-4352-8DF2-5712531B63DB}" type="datetimeFigureOut">
               <a:rPr lang="pt-PT" smtClean="0"/>
-              <a:t>26/02/2018</a:t>
+              <a:t>23/03/2018</a:t>
             </a:fld>
             <a:endParaRPr lang="pt-PT"/>
           </a:p>
@@ -2351,7 +2351,7 @@
           <a:p>
             <a:fld id="{2680F75E-BF8A-4352-8DF2-5712531B63DB}" type="datetimeFigureOut">
               <a:rPr lang="pt-PT" smtClean="0"/>
-              <a:t>26/02/2018</a:t>
+              <a:t>23/03/2018</a:t>
             </a:fld>
             <a:endParaRPr lang="pt-PT"/>
           </a:p>
@@ -2564,7 +2564,7 @@
           <a:p>
             <a:fld id="{2680F75E-BF8A-4352-8DF2-5712531B63DB}" type="datetimeFigureOut">
               <a:rPr lang="pt-PT" smtClean="0"/>
-              <a:t>26/02/2018</a:t>
+              <a:t>23/03/2018</a:t>
             </a:fld>
             <a:endParaRPr lang="pt-PT"/>
           </a:p>
@@ -3283,8 +3283,8 @@
           </a:fontRef>
         </p:style>
       </p:cxnSp>
-      <mc:AlternateContent xmlns:mc="http://schemas.openxmlformats.org/markup-compatibility/2006">
-        <mc:Choice xmlns:a14="http://schemas.microsoft.com/office/drawing/2010/main" Requires="a14">
+      <mc:AlternateContent xmlns:mc="http://schemas.openxmlformats.org/markup-compatibility/2006" xmlns:a14="http://schemas.microsoft.com/office/drawing/2010/main">
+        <mc:Choice Requires="a14">
           <p:sp>
             <p:nvSpPr>
               <p:cNvPr id="234" name="TextBox 233"/>
@@ -3349,7 +3349,7 @@
             </p:txBody>
           </p:sp>
         </mc:Choice>
-        <mc:Fallback>
+        <mc:Fallback xmlns="">
           <p:sp>
             <p:nvSpPr>
               <p:cNvPr id="234" name="TextBox 233"/>
@@ -3388,8 +3388,8 @@
           </p:sp>
         </mc:Fallback>
       </mc:AlternateContent>
-      <mc:AlternateContent xmlns:mc="http://schemas.openxmlformats.org/markup-compatibility/2006">
-        <mc:Choice xmlns:a14="http://schemas.microsoft.com/office/drawing/2010/main" Requires="a14">
+      <mc:AlternateContent xmlns:mc="http://schemas.openxmlformats.org/markup-compatibility/2006" xmlns:a14="http://schemas.microsoft.com/office/drawing/2010/main">
+        <mc:Choice Requires="a14">
           <p:sp>
             <p:nvSpPr>
               <p:cNvPr id="235" name="TextBox 234"/>
@@ -3454,7 +3454,7 @@
             </p:txBody>
           </p:sp>
         </mc:Choice>
-        <mc:Fallback>
+        <mc:Fallback xmlns="">
           <p:sp>
             <p:nvSpPr>
               <p:cNvPr id="235" name="TextBox 234"/>
@@ -3493,8 +3493,8 @@
           </p:sp>
         </mc:Fallback>
       </mc:AlternateContent>
-      <mc:AlternateContent xmlns:mc="http://schemas.openxmlformats.org/markup-compatibility/2006">
-        <mc:Choice xmlns:a14="http://schemas.microsoft.com/office/drawing/2010/main" Requires="a14">
+      <mc:AlternateContent xmlns:mc="http://schemas.openxmlformats.org/markup-compatibility/2006" xmlns:a14="http://schemas.microsoft.com/office/drawing/2010/main">
+        <mc:Choice Requires="a14">
           <p:sp>
             <p:nvSpPr>
               <p:cNvPr id="236" name="TextBox 235"/>
@@ -3559,7 +3559,7 @@
             </p:txBody>
           </p:sp>
         </mc:Choice>
-        <mc:Fallback>
+        <mc:Fallback xmlns="">
           <p:sp>
             <p:nvSpPr>
               <p:cNvPr id="236" name="TextBox 235"/>
@@ -3598,8 +3598,8 @@
           </p:sp>
         </mc:Fallback>
       </mc:AlternateContent>
-      <mc:AlternateContent xmlns:mc="http://schemas.openxmlformats.org/markup-compatibility/2006">
-        <mc:Choice xmlns:a14="http://schemas.microsoft.com/office/drawing/2010/main" Requires="a14">
+      <mc:AlternateContent xmlns:mc="http://schemas.openxmlformats.org/markup-compatibility/2006" xmlns:a14="http://schemas.microsoft.com/office/drawing/2010/main">
+        <mc:Choice Requires="a14">
           <p:sp>
             <p:nvSpPr>
               <p:cNvPr id="237" name="TextBox 236"/>
@@ -3664,7 +3664,7 @@
             </p:txBody>
           </p:sp>
         </mc:Choice>
-        <mc:Fallback>
+        <mc:Fallback xmlns="">
           <p:sp>
             <p:nvSpPr>
               <p:cNvPr id="237" name="TextBox 236"/>
@@ -3786,8 +3786,8 @@
           </a:fontRef>
         </p:style>
       </p:cxnSp>
-      <mc:AlternateContent xmlns:mc="http://schemas.openxmlformats.org/markup-compatibility/2006">
-        <mc:Choice xmlns:a14="http://schemas.microsoft.com/office/drawing/2010/main" Requires="a14">
+      <mc:AlternateContent xmlns:mc="http://schemas.openxmlformats.org/markup-compatibility/2006" xmlns:a14="http://schemas.microsoft.com/office/drawing/2010/main">
+        <mc:Choice Requires="a14">
           <p:sp>
             <p:nvSpPr>
               <p:cNvPr id="5" name="Rectangle 4"/>
@@ -3849,7 +3849,7 @@
             </p:txBody>
           </p:sp>
         </mc:Choice>
-        <mc:Fallback>
+        <mc:Fallback xmlns="">
           <p:sp>
             <p:nvSpPr>
               <p:cNvPr id="5" name="Rectangle 4"/>
@@ -4077,27 +4077,21 @@
               <a:rPr lang="en-US" sz="1400" b="1" dirty="0" smtClean="0">
                 <a:latin typeface="+mj-lt"/>
               </a:rPr>
-              <a:t>Pulse </a:t>
-            </a:r>
-            <a:r>
-              <a:rPr lang="en-US" sz="1400" b="1" dirty="0" smtClean="0">
-                <a:latin typeface="+mj-lt"/>
-              </a:rPr>
-              <a:t>Shaper</a:t>
+              <a:t>Pulse Shaper</a:t>
             </a:r>
           </a:p>
           <a:p>
             <a:pPr algn="ctr"/>
             <a:r>
               <a:rPr lang="en-US" sz="1400" b="1" dirty="0" smtClean="0"/>
-              <a:t>TIME</a:t>
+              <a:t>Impulse Response</a:t>
             </a:r>
             <a:endParaRPr lang="en-US" sz="1400" b="1" dirty="0"/>
           </a:p>
         </p:txBody>
       </p:sp>
-      <mc:AlternateContent xmlns:mc="http://schemas.openxmlformats.org/markup-compatibility/2006">
-        <mc:Choice xmlns:a14="http://schemas.microsoft.com/office/drawing/2010/main" Requires="a14">
+      <mc:AlternateContent xmlns:mc="http://schemas.openxmlformats.org/markup-compatibility/2006" xmlns:a14="http://schemas.microsoft.com/office/drawing/2010/main">
+        <mc:Choice Requires="a14">
           <p:sp>
             <p:nvSpPr>
               <p:cNvPr id="49" name="TextBox 48"/>
@@ -4162,7 +4156,7 @@
             </p:txBody>
           </p:sp>
         </mc:Choice>
-        <mc:Fallback>
+        <mc:Fallback xmlns="">
           <p:sp>
             <p:nvSpPr>
               <p:cNvPr id="49" name="TextBox 48"/>
@@ -4425,10 +4419,10 @@
           <a:p>
             <a:pPr algn="ctr"/>
             <a:r>
-              <a:rPr lang="en-US" b="1" dirty="0" smtClean="0"/>
-              <a:t>FREQUENCY</a:t>
-            </a:r>
-            <a:endParaRPr lang="en-US" b="1" dirty="0"/>
+              <a:rPr lang="en-US" sz="1400" b="1" dirty="0" smtClean="0"/>
+              <a:t>Transfer Function</a:t>
+            </a:r>
+            <a:endParaRPr lang="en-US" sz="1400" b="1" dirty="0"/>
           </a:p>
         </p:txBody>
       </p:sp>
@@ -4558,7 +4552,7 @@
         </p:nvSpPr>
         <p:spPr>
           <a:xfrm>
-            <a:off x="9907534" y="1393793"/>
+            <a:off x="9987624" y="1353126"/>
             <a:ext cx="395040" cy="307777"/>
           </a:xfrm>
           <a:prstGeom prst="rect">
@@ -4588,7 +4582,7 @@
         </p:nvSpPr>
         <p:spPr>
           <a:xfrm>
-            <a:off x="9891358" y="4663780"/>
+            <a:off x="9992449" y="4656136"/>
             <a:ext cx="395040" cy="307777"/>
           </a:xfrm>
           <a:prstGeom prst="rect">
@@ -4610,8 +4604,8 @@
           </a:p>
         </p:txBody>
       </p:sp>
-      <mc:AlternateContent xmlns:mc="http://schemas.openxmlformats.org/markup-compatibility/2006">
-        <mc:Choice xmlns:a14="http://schemas.microsoft.com/office/drawing/2010/main" Requires="a14">
+      <mc:AlternateContent xmlns:mc="http://schemas.openxmlformats.org/markup-compatibility/2006" xmlns:a14="http://schemas.microsoft.com/office/drawing/2010/main">
+        <mc:Choice Requires="a14">
           <p:sp>
             <p:nvSpPr>
               <p:cNvPr id="80" name="TextBox 79"/>
@@ -4676,7 +4670,7 @@
             </p:txBody>
           </p:sp>
         </mc:Choice>
-        <mc:Fallback>
+        <mc:Fallback xmlns="">
           <p:sp>
             <p:nvSpPr>
               <p:cNvPr id="80" name="TextBox 79"/>
@@ -4715,8 +4709,8 @@
           </p:sp>
         </mc:Fallback>
       </mc:AlternateContent>
-      <mc:AlternateContent xmlns:mc="http://schemas.openxmlformats.org/markup-compatibility/2006">
-        <mc:Choice xmlns:a14="http://schemas.microsoft.com/office/drawing/2010/main" Requires="a14">
+      <mc:AlternateContent xmlns:mc="http://schemas.openxmlformats.org/markup-compatibility/2006" xmlns:a14="http://schemas.microsoft.com/office/drawing/2010/main">
+        <mc:Choice Requires="a14">
           <p:sp>
             <p:nvSpPr>
               <p:cNvPr id="81" name="TextBox 80"/>
@@ -4781,7 +4775,7 @@
             </p:txBody>
           </p:sp>
         </mc:Choice>
-        <mc:Fallback>
+        <mc:Fallback xmlns="">
           <p:sp>
             <p:nvSpPr>
               <p:cNvPr id="81" name="TextBox 80"/>
@@ -4820,6 +4814,64 @@
           </p:sp>
         </mc:Fallback>
       </mc:AlternateContent>
+      <p:sp>
+        <p:nvSpPr>
+          <p:cNvPr id="2" name="Rectangle 1"/>
+          <p:cNvSpPr/>
+          <p:nvPr/>
+        </p:nvSpPr>
+        <p:spPr>
+          <a:xfrm>
+            <a:off x="11814974" y="1353126"/>
+            <a:ext cx="377026" cy="307777"/>
+          </a:xfrm>
+          <a:prstGeom prst="rect">
+            <a:avLst/>
+          </a:prstGeom>
+        </p:spPr>
+        <p:txBody>
+          <a:bodyPr wrap="none">
+            <a:spAutoFit/>
+          </a:bodyPr>
+          <a:lstStyle/>
+          <a:p>
+            <a:r>
+              <a:rPr lang="en-US" sz="1400" b="1" dirty="0" smtClean="0"/>
+              <a:t>B8</a:t>
+            </a:r>
+            <a:endParaRPr lang="en-US" sz="1400" dirty="0"/>
+          </a:p>
+        </p:txBody>
+      </p:sp>
+      <p:sp>
+        <p:nvSpPr>
+          <p:cNvPr id="37" name="Rectangle 36"/>
+          <p:cNvSpPr/>
+          <p:nvPr/>
+        </p:nvSpPr>
+        <p:spPr>
+          <a:xfrm>
+            <a:off x="11792715" y="4662824"/>
+            <a:ext cx="377026" cy="307777"/>
+          </a:xfrm>
+          <a:prstGeom prst="rect">
+            <a:avLst/>
+          </a:prstGeom>
+        </p:spPr>
+        <p:txBody>
+          <a:bodyPr wrap="none">
+            <a:spAutoFit/>
+          </a:bodyPr>
+          <a:lstStyle/>
+          <a:p>
+            <a:r>
+              <a:rPr lang="en-US" sz="1400" b="1" dirty="0" smtClean="0"/>
+              <a:t>B9</a:t>
+            </a:r>
+            <a:endParaRPr lang="en-US" sz="1400" dirty="0"/>
+          </a:p>
+        </p:txBody>
+      </p:sp>
     </p:spTree>
     <p:extLst>
       <p:ext uri="{BB962C8B-B14F-4D97-AF65-F5344CB8AC3E}">

</xml_diff>